<commit_message>
Added the shell and python scripts for provisioning and testing the EC2 solution
</commit_message>
<xml_diff>
--- a/doc/SolutionApproach.pptx
+++ b/doc/SolutionApproach.pptx
@@ -5,7 +5,7 @@
     <p:sldMasterId id="2147483648" r:id="rId1"/>
   </p:sldMasterIdLst>
   <p:notesMasterIdLst>
-    <p:notesMasterId r:id="rId8"/>
+    <p:notesMasterId r:id="rId10"/>
   </p:notesMasterIdLst>
   <p:sldIdLst>
     <p:sldId id="256" r:id="rId2"/>
@@ -14,6 +14,8 @@
     <p:sldId id="259" r:id="rId5"/>
     <p:sldId id="260" r:id="rId6"/>
     <p:sldId id="261" r:id="rId7"/>
+    <p:sldId id="263" r:id="rId8"/>
+    <p:sldId id="262" r:id="rId9"/>
   </p:sldIdLst>
   <p:sldSz cx="12192000" cy="6858000"/>
   <p:notesSz cx="6858000" cy="9144000"/>
@@ -112,6 +114,11 @@
       </a:defRPr>
     </a:lvl9pPr>
   </p:defaultTextStyle>
+  <p:extLst>
+    <p:ext uri="{EFAFB233-063F-42B5-8137-9DF3F51BA10A}">
+      <p15:sldGuideLst xmlns:p15="http://schemas.microsoft.com/office/powerpoint/2012/main"/>
+    </p:ext>
+  </p:extLst>
 </p:presentation>
 </file>
 
@@ -197,7 +204,7 @@
           <a:p>
             <a:fld id="{63612171-C156-094A-BCC9-D649502AC784}" type="datetimeFigureOut">
               <a:rPr lang="en-US" smtClean="0"/>
-              <a:t>10/7/17</a:t>
+              <a:t>10/11/17</a:t>
             </a:fld>
             <a:endParaRPr lang="en-US"/>
           </a:p>
@@ -596,7 +603,7 @@
           <a:p>
             <a:fld id="{4268AD50-F623-364A-BB7A-4798632A359E}" type="datetimeFigureOut">
               <a:rPr lang="en-US" smtClean="0"/>
-              <a:t>10/7/17</a:t>
+              <a:t>10/11/17</a:t>
             </a:fld>
             <a:endParaRPr lang="en-US"/>
           </a:p>
@@ -766,7 +773,7 @@
           <a:p>
             <a:fld id="{4268AD50-F623-364A-BB7A-4798632A359E}" type="datetimeFigureOut">
               <a:rPr lang="en-US" smtClean="0"/>
-              <a:t>10/7/17</a:t>
+              <a:t>10/11/17</a:t>
             </a:fld>
             <a:endParaRPr lang="en-US"/>
           </a:p>
@@ -946,7 +953,7 @@
           <a:p>
             <a:fld id="{4268AD50-F623-364A-BB7A-4798632A359E}" type="datetimeFigureOut">
               <a:rPr lang="en-US" smtClean="0"/>
-              <a:t>10/7/17</a:t>
+              <a:t>10/11/17</a:t>
             </a:fld>
             <a:endParaRPr lang="en-US"/>
           </a:p>
@@ -1116,7 +1123,7 @@
           <a:p>
             <a:fld id="{4268AD50-F623-364A-BB7A-4798632A359E}" type="datetimeFigureOut">
               <a:rPr lang="en-US" smtClean="0"/>
-              <a:t>10/7/17</a:t>
+              <a:t>10/11/17</a:t>
             </a:fld>
             <a:endParaRPr lang="en-US"/>
           </a:p>
@@ -1362,7 +1369,7 @@
           <a:p>
             <a:fld id="{4268AD50-F623-364A-BB7A-4798632A359E}" type="datetimeFigureOut">
               <a:rPr lang="en-US" smtClean="0"/>
-              <a:t>10/7/17</a:t>
+              <a:t>10/11/17</a:t>
             </a:fld>
             <a:endParaRPr lang="en-US"/>
           </a:p>
@@ -1594,7 +1601,7 @@
           <a:p>
             <a:fld id="{4268AD50-F623-364A-BB7A-4798632A359E}" type="datetimeFigureOut">
               <a:rPr lang="en-US" smtClean="0"/>
-              <a:t>10/7/17</a:t>
+              <a:t>10/11/17</a:t>
             </a:fld>
             <a:endParaRPr lang="en-US"/>
           </a:p>
@@ -1961,7 +1968,7 @@
           <a:p>
             <a:fld id="{4268AD50-F623-364A-BB7A-4798632A359E}" type="datetimeFigureOut">
               <a:rPr lang="en-US" smtClean="0"/>
-              <a:t>10/7/17</a:t>
+              <a:t>10/11/17</a:t>
             </a:fld>
             <a:endParaRPr lang="en-US"/>
           </a:p>
@@ -2079,7 +2086,7 @@
           <a:p>
             <a:fld id="{4268AD50-F623-364A-BB7A-4798632A359E}" type="datetimeFigureOut">
               <a:rPr lang="en-US" smtClean="0"/>
-              <a:t>10/7/17</a:t>
+              <a:t>10/11/17</a:t>
             </a:fld>
             <a:endParaRPr lang="en-US"/>
           </a:p>
@@ -2174,7 +2181,7 @@
           <a:p>
             <a:fld id="{4268AD50-F623-364A-BB7A-4798632A359E}" type="datetimeFigureOut">
               <a:rPr lang="en-US" smtClean="0"/>
-              <a:t>10/7/17</a:t>
+              <a:t>10/11/17</a:t>
             </a:fld>
             <a:endParaRPr lang="en-US"/>
           </a:p>
@@ -2451,7 +2458,7 @@
           <a:p>
             <a:fld id="{4268AD50-F623-364A-BB7A-4798632A359E}" type="datetimeFigureOut">
               <a:rPr lang="en-US" smtClean="0"/>
-              <a:t>10/7/17</a:t>
+              <a:t>10/11/17</a:t>
             </a:fld>
             <a:endParaRPr lang="en-US"/>
           </a:p>
@@ -2704,7 +2711,7 @@
           <a:p>
             <a:fld id="{4268AD50-F623-364A-BB7A-4798632A359E}" type="datetimeFigureOut">
               <a:rPr lang="en-US" smtClean="0"/>
-              <a:t>10/7/17</a:t>
+              <a:t>10/11/17</a:t>
             </a:fld>
             <a:endParaRPr lang="en-US"/>
           </a:p>
@@ -2917,7 +2924,7 @@
           <a:p>
             <a:fld id="{4268AD50-F623-364A-BB7A-4798632A359E}" type="datetimeFigureOut">
               <a:rPr lang="en-US" smtClean="0"/>
-              <a:t>10/7/17</a:t>
+              <a:t>10/11/17</a:t>
             </a:fld>
             <a:endParaRPr lang="en-US"/>
           </a:p>
@@ -3514,12 +3521,16 @@
               <a:t> </a:t>
             </a:r>
             <a:r>
-              <a:rPr lang="en-US" dirty="0" err="1" smtClean="0"/>
-              <a:t>Cloudformation</a:t>
+              <a:rPr lang="en-US" smtClean="0"/>
+              <a:t>CloudFormation</a:t>
             </a:r>
             <a:r>
               <a:rPr lang="en-US" dirty="0" smtClean="0"/>
-              <a:t> EC2</a:t>
+              <a:t> </a:t>
+            </a:r>
+            <a:r>
+              <a:rPr lang="en-US" dirty="0" smtClean="0"/>
+              <a:t>EC2</a:t>
             </a:r>
             <a:endParaRPr lang="en-US" dirty="0"/>
           </a:p>
@@ -5666,11 +5677,15 @@
             </a:r>
             <a:r>
               <a:rPr lang="en-US" dirty="0" err="1" smtClean="0"/>
-              <a:t>Cloudformation</a:t>
+              <a:t>CloudFormation</a:t>
             </a:r>
             <a:r>
               <a:rPr lang="en-US" dirty="0" smtClean="0"/>
-              <a:t> ECS</a:t>
+              <a:t> </a:t>
+            </a:r>
+            <a:r>
+              <a:rPr lang="en-US" dirty="0" smtClean="0"/>
+              <a:t>ECS</a:t>
             </a:r>
             <a:endParaRPr lang="en-US" dirty="0"/>
           </a:p>
@@ -7402,11 +7417,7 @@
             </a:r>
             <a:r>
               <a:rPr lang="en-US" sz="800" b="1" smtClean="0"/>
-              <a:t>container </a:t>
-            </a:r>
-            <a:r>
-              <a:rPr lang="en-US" sz="800" b="1" smtClean="0"/>
-              <a:t>2</a:t>
+              <a:t>container 2</a:t>
             </a:r>
             <a:endParaRPr lang="en-US" sz="1400" b="1" dirty="0"/>
           </a:p>
@@ -7437,11 +7448,7 @@
             <a:pPr algn="ctr"/>
             <a:r>
               <a:rPr lang="en-US" sz="800" b="1" dirty="0" smtClean="0"/>
-              <a:t>App </a:t>
-            </a:r>
-            <a:r>
-              <a:rPr lang="en-US" sz="800" b="1" dirty="0" smtClean="0"/>
-              <a:t>container </a:t>
+              <a:t>App container </a:t>
             </a:r>
             <a:r>
               <a:rPr lang="en-US" sz="800" b="1" dirty="0"/>
@@ -7546,6 +7553,411 @@
     <p:extLst>
       <p:ext uri="{BB962C8B-B14F-4D97-AF65-F5344CB8AC3E}">
         <p14:creationId xmlns:p14="http://schemas.microsoft.com/office/powerpoint/2010/main" val="904924973"/>
+      </p:ext>
+    </p:extLst>
+  </p:cSld>
+  <p:clrMapOvr>
+    <a:masterClrMapping/>
+  </p:clrMapOvr>
+</p:sld>
+</file>
+
+<file path=ppt/slides/slide7.xml><?xml version="1.0" encoding="utf-8"?>
+<p:sld xmlns:a="http://schemas.openxmlformats.org/drawingml/2006/main" xmlns:r="http://schemas.openxmlformats.org/officeDocument/2006/relationships" xmlns:p="http://schemas.openxmlformats.org/presentationml/2006/main">
+  <p:cSld>
+    <p:spTree>
+      <p:nvGrpSpPr>
+        <p:cNvPr id="1" name=""/>
+        <p:cNvGrpSpPr/>
+        <p:nvPr/>
+      </p:nvGrpSpPr>
+      <p:grpSpPr>
+        <a:xfrm>
+          <a:off x="0" y="0"/>
+          <a:ext cx="0" cy="0"/>
+          <a:chOff x="0" y="0"/>
+          <a:chExt cx="0" cy="0"/>
+        </a:xfrm>
+      </p:grpSpPr>
+      <p:sp>
+        <p:nvSpPr>
+          <p:cNvPr id="2" name="Title 1"/>
+          <p:cNvSpPr>
+            <a:spLocks noGrp="1"/>
+          </p:cNvSpPr>
+          <p:nvPr>
+            <p:ph type="title"/>
+          </p:nvPr>
+        </p:nvSpPr>
+        <p:spPr/>
+        <p:txBody>
+          <a:bodyPr/>
+          <a:lstStyle/>
+          <a:p>
+            <a:r>
+              <a:rPr lang="en-US" dirty="0" smtClean="0"/>
+              <a:t>Solution Approach 1 </a:t>
+            </a:r>
+            <a:r>
+              <a:rPr lang="mr-IN" dirty="0" smtClean="0"/>
+              <a:t>–</a:t>
+            </a:r>
+            <a:r>
+              <a:rPr lang="en-US" dirty="0" smtClean="0"/>
+              <a:t> </a:t>
+            </a:r>
+            <a:r>
+              <a:rPr lang="en-US" dirty="0"/>
+              <a:t>Real </a:t>
+            </a:r>
+            <a:r>
+              <a:rPr lang="en-US" dirty="0" smtClean="0"/>
+              <a:t>world</a:t>
+            </a:r>
+            <a:endParaRPr lang="en-US" dirty="0"/>
+          </a:p>
+        </p:txBody>
+      </p:sp>
+      <p:sp>
+        <p:nvSpPr>
+          <p:cNvPr id="3" name="Content Placeholder 2"/>
+          <p:cNvSpPr>
+            <a:spLocks noGrp="1"/>
+          </p:cNvSpPr>
+          <p:nvPr>
+            <p:ph idx="1"/>
+          </p:nvPr>
+        </p:nvSpPr>
+        <p:spPr/>
+        <p:txBody>
+          <a:bodyPr>
+            <a:normAutofit/>
+          </a:bodyPr>
+          <a:lstStyle/>
+          <a:p>
+            <a:r>
+              <a:rPr lang="en-US" sz="2000" dirty="0" smtClean="0"/>
+              <a:t>Approach</a:t>
+            </a:r>
+          </a:p>
+          <a:p>
+            <a:pPr lvl="1"/>
+            <a:r>
+              <a:rPr lang="en-US" sz="1600" dirty="0" smtClean="0"/>
+              <a:t>Decompose </a:t>
+            </a:r>
+            <a:r>
+              <a:rPr lang="en-US" sz="1600" dirty="0"/>
+              <a:t>the cloud formation template into </a:t>
+            </a:r>
+          </a:p>
+          <a:p>
+            <a:pPr lvl="2"/>
+            <a:r>
+              <a:rPr lang="en-US" sz="1200" dirty="0"/>
+              <a:t>Base infrastructure like VPC, Subnets, route tables etc. and </a:t>
+            </a:r>
+            <a:r>
+              <a:rPr lang="en-US" sz="1200" dirty="0" smtClean="0"/>
+              <a:t>Mongo DB EC2</a:t>
+            </a:r>
+            <a:endParaRPr lang="en-US" sz="1200" dirty="0"/>
+          </a:p>
+          <a:p>
+            <a:pPr lvl="2"/>
+            <a:r>
+              <a:rPr lang="en-US" sz="1200" dirty="0" smtClean="0"/>
+              <a:t>Application infrastructure like load balancers, auto scaling groups and launch configurations</a:t>
+            </a:r>
+            <a:endParaRPr lang="en-US" sz="1600" dirty="0" smtClean="0"/>
+          </a:p>
+          <a:p>
+            <a:r>
+              <a:rPr lang="en-US" sz="2000" dirty="0" smtClean="0"/>
+              <a:t>One </a:t>
+            </a:r>
+            <a:r>
+              <a:rPr lang="en-US" sz="2000" dirty="0"/>
+              <a:t>time setup</a:t>
+            </a:r>
+          </a:p>
+          <a:p>
+            <a:pPr lvl="1"/>
+            <a:r>
+              <a:rPr lang="en-US" sz="1600" dirty="0" smtClean="0"/>
+              <a:t>Deploy </a:t>
+            </a:r>
+            <a:r>
+              <a:rPr lang="en-US" sz="1600" dirty="0"/>
+              <a:t>the cloud formation template with the infrastructure components (</a:t>
+            </a:r>
+            <a:r>
+              <a:rPr lang="en-US" sz="1600" dirty="0" err="1"/>
+              <a:t>vpc</a:t>
+            </a:r>
+            <a:r>
+              <a:rPr lang="en-US" sz="1600" dirty="0"/>
+              <a:t>, subnets, route tables, security groups, load balancers and MongoDB</a:t>
+            </a:r>
+            <a:r>
+              <a:rPr lang="en-US" sz="2000" dirty="0" smtClean="0"/>
+              <a:t>)</a:t>
+            </a:r>
+            <a:endParaRPr lang="en-US" sz="2000" dirty="0" smtClean="0"/>
+          </a:p>
+          <a:p>
+            <a:r>
+              <a:rPr lang="en-US" sz="2000" dirty="0" smtClean="0"/>
+              <a:t>For every deployment</a:t>
+            </a:r>
+          </a:p>
+          <a:p>
+            <a:pPr lvl="1"/>
+            <a:r>
+              <a:rPr lang="en-US" sz="1600" dirty="0" smtClean="0"/>
+              <a:t>Update the EC2 launch configuration to include the latest voter service jar and update the </a:t>
+            </a:r>
+            <a:r>
+              <a:rPr lang="en-US" sz="1600" dirty="0" err="1" smtClean="0"/>
+              <a:t>cf</a:t>
+            </a:r>
+            <a:r>
+              <a:rPr lang="en-US" sz="1600" dirty="0" smtClean="0"/>
+              <a:t> stack through a Jenkins CI pipeline</a:t>
+            </a:r>
+            <a:endParaRPr lang="en-US" sz="2000" dirty="0" smtClean="0"/>
+          </a:p>
+          <a:p>
+            <a:endParaRPr lang="en-US" dirty="0"/>
+          </a:p>
+        </p:txBody>
+      </p:sp>
+    </p:spTree>
+    <p:extLst>
+      <p:ext uri="{BB962C8B-B14F-4D97-AF65-F5344CB8AC3E}">
+        <p14:creationId xmlns:p14="http://schemas.microsoft.com/office/powerpoint/2010/main" val="844698908"/>
+      </p:ext>
+    </p:extLst>
+  </p:cSld>
+  <p:clrMapOvr>
+    <a:masterClrMapping/>
+  </p:clrMapOvr>
+</p:sld>
+</file>
+
+<file path=ppt/slides/slide8.xml><?xml version="1.0" encoding="utf-8"?>
+<p:sld xmlns:a="http://schemas.openxmlformats.org/drawingml/2006/main" xmlns:r="http://schemas.openxmlformats.org/officeDocument/2006/relationships" xmlns:p="http://schemas.openxmlformats.org/presentationml/2006/main">
+  <p:cSld>
+    <p:spTree>
+      <p:nvGrpSpPr>
+        <p:cNvPr id="1" name=""/>
+        <p:cNvGrpSpPr/>
+        <p:nvPr/>
+      </p:nvGrpSpPr>
+      <p:grpSpPr>
+        <a:xfrm>
+          <a:off x="0" y="0"/>
+          <a:ext cx="0" cy="0"/>
+          <a:chOff x="0" y="0"/>
+          <a:chExt cx="0" cy="0"/>
+        </a:xfrm>
+      </p:grpSpPr>
+      <p:sp>
+        <p:nvSpPr>
+          <p:cNvPr id="2" name="Title 1"/>
+          <p:cNvSpPr>
+            <a:spLocks noGrp="1"/>
+          </p:cNvSpPr>
+          <p:nvPr>
+            <p:ph type="title"/>
+          </p:nvPr>
+        </p:nvSpPr>
+        <p:spPr/>
+        <p:txBody>
+          <a:bodyPr/>
+          <a:lstStyle/>
+          <a:p>
+            <a:r>
+              <a:rPr lang="en-US" dirty="0" smtClean="0"/>
+              <a:t>Solution Approach </a:t>
+            </a:r>
+            <a:r>
+              <a:rPr lang="en-US" dirty="0"/>
+              <a:t>2</a:t>
+            </a:r>
+            <a:r>
+              <a:rPr lang="en-US" dirty="0" smtClean="0"/>
+              <a:t> </a:t>
+            </a:r>
+            <a:r>
+              <a:rPr lang="mr-IN" dirty="0" smtClean="0"/>
+              <a:t>–</a:t>
+            </a:r>
+            <a:r>
+              <a:rPr lang="en-US" dirty="0" smtClean="0"/>
+              <a:t> </a:t>
+            </a:r>
+            <a:r>
+              <a:rPr lang="en-US" dirty="0" smtClean="0"/>
+              <a:t>Real world</a:t>
+            </a:r>
+            <a:endParaRPr lang="en-US" dirty="0"/>
+          </a:p>
+        </p:txBody>
+      </p:sp>
+      <p:sp>
+        <p:nvSpPr>
+          <p:cNvPr id="3" name="Content Placeholder 2"/>
+          <p:cNvSpPr>
+            <a:spLocks noGrp="1"/>
+          </p:cNvSpPr>
+          <p:nvPr>
+            <p:ph idx="1"/>
+          </p:nvPr>
+        </p:nvSpPr>
+        <p:spPr/>
+        <p:txBody>
+          <a:bodyPr>
+            <a:normAutofit/>
+          </a:bodyPr>
+          <a:lstStyle/>
+          <a:p>
+            <a:r>
+              <a:rPr lang="en-US" sz="2000" dirty="0" smtClean="0"/>
+              <a:t>One time setup</a:t>
+            </a:r>
+          </a:p>
+          <a:p>
+            <a:pPr lvl="1"/>
+            <a:r>
+              <a:rPr lang="en-US" sz="1600" dirty="0" smtClean="0"/>
+              <a:t>Deploy the </a:t>
+            </a:r>
+            <a:r>
+              <a:rPr lang="en-US" sz="1600" dirty="0" smtClean="0"/>
+              <a:t>cloud formation template with the infrastructure components (</a:t>
+            </a:r>
+            <a:r>
+              <a:rPr lang="en-US" sz="1600" dirty="0" err="1" smtClean="0"/>
+              <a:t>vpc</a:t>
+            </a:r>
+            <a:r>
+              <a:rPr lang="en-US" sz="1600" dirty="0" smtClean="0"/>
+              <a:t>, subnets, </a:t>
+            </a:r>
+            <a:r>
+              <a:rPr lang="en-US" sz="1600" dirty="0" smtClean="0"/>
+              <a:t>route tables, security groups, clusters, load balancers and MongoDB</a:t>
+            </a:r>
+            <a:r>
+              <a:rPr lang="en-US" sz="2000" dirty="0" smtClean="0"/>
+              <a:t>)</a:t>
+            </a:r>
+          </a:p>
+          <a:p>
+            <a:r>
+              <a:rPr lang="en-US" sz="2000" dirty="0" smtClean="0"/>
+              <a:t>Write </a:t>
+            </a:r>
+            <a:r>
+              <a:rPr lang="en-US" sz="2000" dirty="0" smtClean="0"/>
+              <a:t>a shell script / python program / Jenkins pipeline to </a:t>
+            </a:r>
+          </a:p>
+          <a:p>
+            <a:pPr lvl="1"/>
+            <a:r>
+              <a:rPr lang="en-US" sz="1600" dirty="0" smtClean="0"/>
+              <a:t>Download the jar file from </a:t>
+            </a:r>
+            <a:r>
+              <a:rPr lang="en-US" sz="1600" dirty="0" err="1" smtClean="0"/>
+              <a:t>git</a:t>
+            </a:r>
+            <a:endParaRPr lang="en-US" sz="1600" dirty="0" smtClean="0"/>
+          </a:p>
+          <a:p>
+            <a:pPr lvl="1"/>
+            <a:r>
+              <a:rPr lang="en-US" sz="1600" dirty="0" smtClean="0"/>
+              <a:t>Create a </a:t>
+            </a:r>
+            <a:r>
+              <a:rPr lang="en-US" sz="1600" dirty="0" err="1" smtClean="0"/>
+              <a:t>docker</a:t>
+            </a:r>
+            <a:r>
+              <a:rPr lang="en-US" sz="1600" dirty="0" smtClean="0"/>
+              <a:t> image using a </a:t>
+            </a:r>
+            <a:r>
+              <a:rPr lang="en-US" sz="1600" dirty="0" err="1" smtClean="0"/>
+              <a:t>Dockerfile</a:t>
+            </a:r>
+            <a:endParaRPr lang="en-US" sz="1600" dirty="0" smtClean="0"/>
+          </a:p>
+          <a:p>
+            <a:pPr lvl="1"/>
+            <a:r>
+              <a:rPr lang="en-US" sz="1600" dirty="0" smtClean="0"/>
+              <a:t>Push the Docker image to the ECS repo</a:t>
+            </a:r>
+          </a:p>
+          <a:p>
+            <a:pPr lvl="1"/>
+            <a:r>
+              <a:rPr lang="en-US" sz="1600" dirty="0" smtClean="0"/>
+              <a:t>Trigger </a:t>
+            </a:r>
+            <a:r>
+              <a:rPr lang="en-US" sz="1600" dirty="0" err="1" smtClean="0"/>
+              <a:t>cloudformation</a:t>
+            </a:r>
+            <a:r>
+              <a:rPr lang="en-US" sz="1600" dirty="0" smtClean="0"/>
+              <a:t> through the AWS API to build the ECS cluster, tasks </a:t>
+            </a:r>
+            <a:r>
+              <a:rPr lang="en-US" sz="1600" dirty="0" err="1" smtClean="0"/>
+              <a:t>etc</a:t>
+            </a:r>
+            <a:r>
+              <a:rPr lang="en-US" sz="1600" dirty="0" smtClean="0"/>
+              <a:t> </a:t>
+            </a:r>
+          </a:p>
+          <a:p>
+            <a:r>
+              <a:rPr lang="en-US" sz="2000" dirty="0" smtClean="0"/>
+              <a:t>Write a python program to test the infrastructure by running the functional tests of the app (will need to research if there is a better way)</a:t>
+            </a:r>
+          </a:p>
+          <a:p>
+            <a:endParaRPr lang="en-US" sz="2000" dirty="0"/>
+          </a:p>
+          <a:p>
+            <a:r>
+              <a:rPr lang="en-US" sz="2000" dirty="0" smtClean="0"/>
+              <a:t>Note: The ECS repo will be pre-created either thru </a:t>
+            </a:r>
+            <a:r>
+              <a:rPr lang="en-US" sz="2000" dirty="0" err="1" smtClean="0"/>
+              <a:t>cloudformation</a:t>
+            </a:r>
+            <a:r>
+              <a:rPr lang="en-US" sz="2000" dirty="0" smtClean="0"/>
+              <a:t> or AWS API</a:t>
+            </a:r>
+          </a:p>
+          <a:p>
+            <a:endParaRPr lang="en-US" dirty="0"/>
+          </a:p>
+        </p:txBody>
+      </p:sp>
+    </p:spTree>
+    <p:extLst>
+      <p:ext uri="{BB962C8B-B14F-4D97-AF65-F5344CB8AC3E}">
+        <p14:creationId xmlns:p14="http://schemas.microsoft.com/office/powerpoint/2010/main" val="1326613954"/>
       </p:ext>
     </p:extLst>
   </p:cSld>

</xml_diff>